<commit_message>
fix plan de develop, schema Ex1, 3 category
</commit_message>
<xml_diff>
--- a/Extension of SORA method to Cyber Security of Unmanned Aircraft System/image/slides.pptx
+++ b/Extension of SORA method to Cyber Security of Unmanned Aircraft System/image/slides.pptx
@@ -218,7 +218,7 @@
           <a:p>
             <a:fld id="{2464F6E3-8F67-453A-B209-4C40F8A486CB}" type="datetimeFigureOut">
               <a:rPr lang="fr-FR" smtClean="0"/>
-              <a:t>20/02/2020</a:t>
+              <a:t>24/02/2020</a:t>
             </a:fld>
             <a:endParaRPr lang="fr-FR"/>
           </a:p>
@@ -1250,7 +1250,7 @@
           <a:p>
             <a:fld id="{76C939EF-1B90-44F9-86B3-203EC674F7DF}" type="datetimeFigureOut">
               <a:rPr lang="fr-FR" smtClean="0"/>
-              <a:t>20/02/2020</a:t>
+              <a:t>24/02/2020</a:t>
             </a:fld>
             <a:endParaRPr lang="fr-FR"/>
           </a:p>
@@ -1420,7 +1420,7 @@
           <a:p>
             <a:fld id="{76C939EF-1B90-44F9-86B3-203EC674F7DF}" type="datetimeFigureOut">
               <a:rPr lang="fr-FR" smtClean="0"/>
-              <a:t>20/02/2020</a:t>
+              <a:t>24/02/2020</a:t>
             </a:fld>
             <a:endParaRPr lang="fr-FR"/>
           </a:p>
@@ -1600,7 +1600,7 @@
           <a:p>
             <a:fld id="{76C939EF-1B90-44F9-86B3-203EC674F7DF}" type="datetimeFigureOut">
               <a:rPr lang="fr-FR" smtClean="0"/>
-              <a:t>20/02/2020</a:t>
+              <a:t>24/02/2020</a:t>
             </a:fld>
             <a:endParaRPr lang="fr-FR"/>
           </a:p>
@@ -2306,7 +2306,7 @@
           <a:p>
             <a:fld id="{76C939EF-1B90-44F9-86B3-203EC674F7DF}" type="datetimeFigureOut">
               <a:rPr lang="fr-FR" smtClean="0"/>
-              <a:t>20/02/2020</a:t>
+              <a:t>24/02/2020</a:t>
             </a:fld>
             <a:endParaRPr lang="fr-FR"/>
           </a:p>
@@ -2552,7 +2552,7 @@
           <a:p>
             <a:fld id="{76C939EF-1B90-44F9-86B3-203EC674F7DF}" type="datetimeFigureOut">
               <a:rPr lang="fr-FR" smtClean="0"/>
-              <a:t>20/02/2020</a:t>
+              <a:t>24/02/2020</a:t>
             </a:fld>
             <a:endParaRPr lang="fr-FR"/>
           </a:p>
@@ -2784,7 +2784,7 @@
           <a:p>
             <a:fld id="{76C939EF-1B90-44F9-86B3-203EC674F7DF}" type="datetimeFigureOut">
               <a:rPr lang="fr-FR" smtClean="0"/>
-              <a:t>20/02/2020</a:t>
+              <a:t>24/02/2020</a:t>
             </a:fld>
             <a:endParaRPr lang="fr-FR"/>
           </a:p>
@@ -3151,7 +3151,7 @@
           <a:p>
             <a:fld id="{76C939EF-1B90-44F9-86B3-203EC674F7DF}" type="datetimeFigureOut">
               <a:rPr lang="fr-FR" smtClean="0"/>
-              <a:t>20/02/2020</a:t>
+              <a:t>24/02/2020</a:t>
             </a:fld>
             <a:endParaRPr lang="fr-FR"/>
           </a:p>
@@ -3269,7 +3269,7 @@
           <a:p>
             <a:fld id="{76C939EF-1B90-44F9-86B3-203EC674F7DF}" type="datetimeFigureOut">
               <a:rPr lang="fr-FR" smtClean="0"/>
-              <a:t>20/02/2020</a:t>
+              <a:t>24/02/2020</a:t>
             </a:fld>
             <a:endParaRPr lang="fr-FR"/>
           </a:p>
@@ -3364,7 +3364,7 @@
           <a:p>
             <a:fld id="{76C939EF-1B90-44F9-86B3-203EC674F7DF}" type="datetimeFigureOut">
               <a:rPr lang="fr-FR" smtClean="0"/>
-              <a:t>20/02/2020</a:t>
+              <a:t>24/02/2020</a:t>
             </a:fld>
             <a:endParaRPr lang="fr-FR"/>
           </a:p>
@@ -3641,7 +3641,7 @@
           <a:p>
             <a:fld id="{76C939EF-1B90-44F9-86B3-203EC674F7DF}" type="datetimeFigureOut">
               <a:rPr lang="fr-FR" smtClean="0"/>
-              <a:t>20/02/2020</a:t>
+              <a:t>24/02/2020</a:t>
             </a:fld>
             <a:endParaRPr lang="fr-FR"/>
           </a:p>
@@ -3894,7 +3894,7 @@
           <a:p>
             <a:fld id="{76C939EF-1B90-44F9-86B3-203EC674F7DF}" type="datetimeFigureOut">
               <a:rPr lang="fr-FR" smtClean="0"/>
-              <a:t>20/02/2020</a:t>
+              <a:t>24/02/2020</a:t>
             </a:fld>
             <a:endParaRPr lang="fr-FR"/>
           </a:p>
@@ -4107,7 +4107,7 @@
           <a:p>
             <a:fld id="{76C939EF-1B90-44F9-86B3-203EC674F7DF}" type="datetimeFigureOut">
               <a:rPr lang="fr-FR" smtClean="0"/>
-              <a:t>20/02/2020</a:t>
+              <a:t>24/02/2020</a:t>
             </a:fld>
             <a:endParaRPr lang="fr-FR"/>
           </a:p>
@@ -15071,13 +15071,13 @@
       </p:sp>
       <p:sp>
         <p:nvSpPr>
-          <p:cNvPr id="21" name="Rectangle 20"/>
+          <p:cNvPr id="62" name="Rectangle 61"/>
           <p:cNvSpPr/>
           <p:nvPr/>
         </p:nvSpPr>
         <p:spPr>
           <a:xfrm>
-            <a:off x="5157538" y="3867238"/>
+            <a:off x="5141062" y="3504772"/>
             <a:ext cx="1828800" cy="545911"/>
           </a:xfrm>
           <a:prstGeom prst="rect">
@@ -15133,13 +15133,13 @@
       </p:sp>
       <p:sp>
         <p:nvSpPr>
-          <p:cNvPr id="22" name="Rectangle 21"/>
+          <p:cNvPr id="63" name="Rectangle 62"/>
           <p:cNvSpPr/>
           <p:nvPr/>
         </p:nvSpPr>
         <p:spPr>
           <a:xfrm>
-            <a:off x="1944779" y="1407687"/>
+            <a:off x="1928303" y="1045221"/>
             <a:ext cx="1916778" cy="395183"/>
           </a:xfrm>
           <a:prstGeom prst="rect">
@@ -15197,13 +15197,13 @@
       </p:sp>
       <p:sp>
         <p:nvSpPr>
-          <p:cNvPr id="23" name="Rectangle 22"/>
+          <p:cNvPr id="64" name="Rectangle 63"/>
           <p:cNvSpPr/>
           <p:nvPr/>
         </p:nvSpPr>
         <p:spPr>
           <a:xfrm>
-            <a:off x="1944776" y="1933898"/>
+            <a:off x="1928300" y="1571432"/>
             <a:ext cx="1916779" cy="376095"/>
           </a:xfrm>
           <a:prstGeom prst="rect">
@@ -15261,13 +15261,13 @@
       </p:sp>
       <p:sp>
         <p:nvSpPr>
-          <p:cNvPr id="24" name="Rectangle 23"/>
+          <p:cNvPr id="65" name="Rectangle 64"/>
           <p:cNvSpPr/>
           <p:nvPr/>
         </p:nvSpPr>
         <p:spPr>
           <a:xfrm>
-            <a:off x="1944777" y="2443538"/>
+            <a:off x="1928301" y="2081072"/>
             <a:ext cx="1943990" cy="586509"/>
           </a:xfrm>
           <a:prstGeom prst="rect">
@@ -15325,13 +15325,13 @@
       </p:sp>
       <p:sp>
         <p:nvSpPr>
-          <p:cNvPr id="25" name="Rectangle 24"/>
+          <p:cNvPr id="66" name="Rectangle 65"/>
           <p:cNvSpPr/>
           <p:nvPr/>
         </p:nvSpPr>
         <p:spPr>
           <a:xfrm>
-            <a:off x="1931173" y="3131133"/>
+            <a:off x="1914697" y="2768667"/>
             <a:ext cx="1957594" cy="788423"/>
           </a:xfrm>
           <a:prstGeom prst="rect">
@@ -15389,13 +15389,13 @@
       </p:sp>
       <p:sp>
         <p:nvSpPr>
-          <p:cNvPr id="26" name="Rectangle 25"/>
+          <p:cNvPr id="67" name="Rectangle 66"/>
           <p:cNvSpPr/>
           <p:nvPr/>
         </p:nvSpPr>
         <p:spPr>
           <a:xfrm>
-            <a:off x="7757722" y="1416725"/>
+            <a:off x="7741246" y="1054259"/>
             <a:ext cx="2190937" cy="600502"/>
           </a:xfrm>
           <a:prstGeom prst="rect">
@@ -15451,13 +15451,13 @@
       </p:sp>
       <p:sp>
         <p:nvSpPr>
-          <p:cNvPr id="27" name="Rectangle 26"/>
+          <p:cNvPr id="68" name="Rectangle 67"/>
           <p:cNvSpPr/>
           <p:nvPr/>
         </p:nvSpPr>
         <p:spPr>
           <a:xfrm>
-            <a:off x="7793295" y="2928154"/>
+            <a:off x="7776819" y="2565688"/>
             <a:ext cx="2190937" cy="600502"/>
           </a:xfrm>
           <a:prstGeom prst="rect">
@@ -15513,16 +15513,16 @@
       </p:sp>
       <p:cxnSp>
         <p:nvCxnSpPr>
-          <p:cNvPr id="28" name="Elbow Connector 27"/>
+          <p:cNvPr id="69" name="Elbow Connector 68"/>
           <p:cNvCxnSpPr>
-            <a:stCxn id="22" idx="3"/>
-            <a:endCxn id="21" idx="1"/>
+            <a:stCxn id="63" idx="3"/>
+            <a:endCxn id="62" idx="1"/>
           </p:cNvCxnSpPr>
           <p:nvPr/>
         </p:nvCxnSpPr>
         <p:spPr>
           <a:xfrm>
-            <a:off x="3861557" y="1605279"/>
+            <a:off x="3845081" y="1242813"/>
             <a:ext cx="1295981" cy="2534915"/>
           </a:xfrm>
           <a:prstGeom prst="bentConnector3">
@@ -15554,16 +15554,16 @@
       </p:cxnSp>
       <p:cxnSp>
         <p:nvCxnSpPr>
-          <p:cNvPr id="29" name="Elbow Connector 28"/>
+          <p:cNvPr id="70" name="Elbow Connector 69"/>
           <p:cNvCxnSpPr>
-            <a:stCxn id="23" idx="3"/>
-            <a:endCxn id="21" idx="1"/>
+            <a:stCxn id="64" idx="3"/>
+            <a:endCxn id="62" idx="1"/>
           </p:cNvCxnSpPr>
           <p:nvPr/>
         </p:nvCxnSpPr>
         <p:spPr>
           <a:xfrm>
-            <a:off x="3861555" y="2121946"/>
+            <a:off x="3845079" y="1759480"/>
             <a:ext cx="1295983" cy="2018248"/>
           </a:xfrm>
           <a:prstGeom prst="bentConnector3">
@@ -15595,16 +15595,16 @@
       </p:cxnSp>
       <p:cxnSp>
         <p:nvCxnSpPr>
-          <p:cNvPr id="30" name="Elbow Connector 29"/>
+          <p:cNvPr id="71" name="Elbow Connector 70"/>
           <p:cNvCxnSpPr>
-            <a:stCxn id="24" idx="3"/>
-            <a:endCxn id="21" idx="1"/>
+            <a:stCxn id="65" idx="3"/>
+            <a:endCxn id="62" idx="1"/>
           </p:cNvCxnSpPr>
           <p:nvPr/>
         </p:nvCxnSpPr>
         <p:spPr>
           <a:xfrm>
-            <a:off x="3888767" y="2736793"/>
+            <a:off x="3872291" y="2374327"/>
             <a:ext cx="1268771" cy="1403401"/>
           </a:xfrm>
           <a:prstGeom prst="bentConnector3">
@@ -15636,16 +15636,16 @@
       </p:cxnSp>
       <p:cxnSp>
         <p:nvCxnSpPr>
-          <p:cNvPr id="31" name="Elbow Connector 30"/>
+          <p:cNvPr id="72" name="Elbow Connector 71"/>
           <p:cNvCxnSpPr>
-            <a:stCxn id="25" idx="3"/>
-            <a:endCxn id="21" idx="1"/>
+            <a:stCxn id="66" idx="3"/>
+            <a:endCxn id="62" idx="1"/>
           </p:cNvCxnSpPr>
           <p:nvPr/>
         </p:nvCxnSpPr>
         <p:spPr>
           <a:xfrm>
-            <a:off x="3888767" y="3525345"/>
+            <a:off x="3872291" y="3162879"/>
             <a:ext cx="1268771" cy="614849"/>
           </a:xfrm>
           <a:prstGeom prst="bentConnector3">
@@ -15677,16 +15677,16 @@
       </p:cxnSp>
       <p:cxnSp>
         <p:nvCxnSpPr>
-          <p:cNvPr id="32" name="Elbow Connector 31"/>
+          <p:cNvPr id="73" name="Elbow Connector 72"/>
           <p:cNvCxnSpPr>
-            <a:stCxn id="21" idx="3"/>
-            <a:endCxn id="26" idx="1"/>
+            <a:stCxn id="62" idx="3"/>
+            <a:endCxn id="67" idx="1"/>
           </p:cNvCxnSpPr>
           <p:nvPr/>
         </p:nvCxnSpPr>
         <p:spPr>
           <a:xfrm flipV="1">
-            <a:off x="6986338" y="1716976"/>
+            <a:off x="6969862" y="1354510"/>
             <a:ext cx="771384" cy="2423218"/>
           </a:xfrm>
           <a:prstGeom prst="bentConnector3">
@@ -15718,16 +15718,16 @@
       </p:cxnSp>
       <p:cxnSp>
         <p:nvCxnSpPr>
-          <p:cNvPr id="33" name="Elbow Connector 32"/>
+          <p:cNvPr id="74" name="Elbow Connector 73"/>
           <p:cNvCxnSpPr>
-            <a:stCxn id="21" idx="3"/>
-            <a:endCxn id="27" idx="1"/>
+            <a:stCxn id="62" idx="3"/>
+            <a:endCxn id="68" idx="1"/>
           </p:cNvCxnSpPr>
           <p:nvPr/>
         </p:nvCxnSpPr>
         <p:spPr>
           <a:xfrm flipV="1">
-            <a:off x="6986338" y="3228405"/>
+            <a:off x="6969862" y="2865939"/>
             <a:ext cx="806957" cy="911789"/>
           </a:xfrm>
           <a:prstGeom prst="bentConnector3">
@@ -15759,13 +15759,13 @@
       </p:cxnSp>
       <p:sp>
         <p:nvSpPr>
-          <p:cNvPr id="78" name="Rectangle 77"/>
+          <p:cNvPr id="75" name="Rectangle 74"/>
           <p:cNvSpPr/>
           <p:nvPr/>
         </p:nvSpPr>
         <p:spPr>
           <a:xfrm>
-            <a:off x="1971988" y="4773075"/>
+            <a:off x="1955512" y="4410609"/>
             <a:ext cx="1916779" cy="786518"/>
           </a:xfrm>
           <a:prstGeom prst="rect">
@@ -15823,16 +15823,16 @@
       </p:sp>
       <p:cxnSp>
         <p:nvCxnSpPr>
-          <p:cNvPr id="90" name="Elbow Connector 89"/>
+          <p:cNvPr id="76" name="Elbow Connector 75"/>
           <p:cNvCxnSpPr>
-            <a:stCxn id="78" idx="3"/>
-            <a:endCxn id="21" idx="1"/>
+            <a:stCxn id="75" idx="3"/>
+            <a:endCxn id="62" idx="1"/>
           </p:cNvCxnSpPr>
           <p:nvPr/>
         </p:nvCxnSpPr>
         <p:spPr>
           <a:xfrm flipV="1">
-            <a:off x="3888767" y="4140194"/>
+            <a:off x="3872291" y="3777728"/>
             <a:ext cx="1268771" cy="1026140"/>
           </a:xfrm>
           <a:prstGeom prst="bentConnector3">
@@ -15864,13 +15864,13 @@
       </p:cxnSp>
       <p:sp>
         <p:nvSpPr>
-          <p:cNvPr id="98" name="Rectangle 97"/>
+          <p:cNvPr id="77" name="Rectangle 76"/>
           <p:cNvSpPr/>
           <p:nvPr/>
         </p:nvSpPr>
         <p:spPr>
           <a:xfrm>
-            <a:off x="7793296" y="4709662"/>
+            <a:off x="7776820" y="4347196"/>
             <a:ext cx="2190936" cy="849931"/>
           </a:xfrm>
           <a:prstGeom prst="rect">
@@ -15946,16 +15946,16 @@
       </p:sp>
       <p:cxnSp>
         <p:nvCxnSpPr>
-          <p:cNvPr id="121" name="Elbow Connector 120"/>
+          <p:cNvPr id="79" name="Elbow Connector 78"/>
           <p:cNvCxnSpPr>
-            <a:stCxn id="21" idx="3"/>
-            <a:endCxn id="98" idx="1"/>
+            <a:stCxn id="62" idx="3"/>
+            <a:endCxn id="77" idx="1"/>
           </p:cNvCxnSpPr>
           <p:nvPr/>
         </p:nvCxnSpPr>
         <p:spPr>
           <a:xfrm>
-            <a:off x="6986338" y="4140194"/>
+            <a:off x="6969862" y="3777728"/>
             <a:ext cx="806958" cy="994434"/>
           </a:xfrm>
           <a:prstGeom prst="bentConnector3">
@@ -15987,13 +15987,13 @@
       </p:cxnSp>
       <p:sp>
         <p:nvSpPr>
-          <p:cNvPr id="129" name="Rectangle 128"/>
+          <p:cNvPr id="80" name="Rectangle 79"/>
           <p:cNvSpPr/>
           <p:nvPr/>
         </p:nvSpPr>
         <p:spPr>
           <a:xfrm>
-            <a:off x="1927859" y="4324443"/>
+            <a:off x="1911383" y="3961977"/>
             <a:ext cx="2958177" cy="1346683"/>
           </a:xfrm>
           <a:prstGeom prst="rect">
@@ -16029,6 +16029,16 @@
           <a:p>
             <a:pPr algn="ctr"/>
             <a:r>
+              <a:rPr lang="en-US" b="1" dirty="0" smtClean="0">
+                <a:solidFill>
+                  <a:schemeClr val="tx1"/>
+                </a:solidFill>
+                <a:latin typeface="Times New Roman" panose="02020603050405020304" pitchFamily="18" charset="0"/>
+                <a:cs typeface="Times New Roman" panose="02020603050405020304" pitchFamily="18" charset="0"/>
+              </a:rPr>
+              <a:t>Threat</a:t>
+            </a:r>
+            <a:r>
               <a:rPr lang="fr-FR" b="1" dirty="0" smtClean="0">
                 <a:solidFill>
                   <a:schemeClr val="tx1"/>
@@ -16036,7 +16046,7 @@
                 <a:latin typeface="Times New Roman" panose="02020603050405020304" pitchFamily="18" charset="0"/>
                 <a:cs typeface="Times New Roman" panose="02020603050405020304" pitchFamily="18" charset="0"/>
               </a:rPr>
-              <a:t>Extension 2</a:t>
+              <a:t> Extension</a:t>
             </a:r>
             <a:endParaRPr lang="fr-FR" b="1" dirty="0">
               <a:solidFill>
@@ -16050,13 +16060,13 @@
       </p:sp>
       <p:sp>
         <p:nvSpPr>
-          <p:cNvPr id="130" name="Rectangle 129"/>
+          <p:cNvPr id="81" name="Rectangle 80"/>
           <p:cNvSpPr/>
           <p:nvPr/>
         </p:nvSpPr>
         <p:spPr>
           <a:xfrm>
-            <a:off x="7647984" y="4324443"/>
+            <a:off x="7631508" y="3961977"/>
             <a:ext cx="2410415" cy="1344322"/>
           </a:xfrm>
           <a:prstGeom prst="rect">
@@ -16092,6 +16102,16 @@
           <a:p>
             <a:pPr algn="ctr"/>
             <a:r>
+              <a:rPr lang="en-US" b="1" dirty="0" smtClean="0">
+                <a:solidFill>
+                  <a:schemeClr val="tx1"/>
+                </a:solidFill>
+                <a:latin typeface="Times New Roman" panose="02020603050405020304" pitchFamily="18" charset="0"/>
+                <a:cs typeface="Times New Roman" panose="02020603050405020304" pitchFamily="18" charset="0"/>
+              </a:rPr>
+              <a:t>Harm</a:t>
+            </a:r>
+            <a:r>
               <a:rPr lang="fr-FR" b="1" dirty="0" smtClean="0">
                 <a:solidFill>
                   <a:schemeClr val="tx1"/>
@@ -16099,7 +16119,7 @@
                 <a:latin typeface="Times New Roman" panose="02020603050405020304" pitchFamily="18" charset="0"/>
                 <a:cs typeface="Times New Roman" panose="02020603050405020304" pitchFamily="18" charset="0"/>
               </a:rPr>
-              <a:t>Extension 1</a:t>
+              <a:t> Extension</a:t>
             </a:r>
             <a:endParaRPr lang="fr-FR" b="1" dirty="0">
               <a:solidFill>
@@ -16113,13 +16133,13 @@
       </p:sp>
       <p:sp>
         <p:nvSpPr>
-          <p:cNvPr id="34" name="Left Brace 33"/>
+          <p:cNvPr id="82" name="Left Brace 81"/>
           <p:cNvSpPr/>
           <p:nvPr/>
         </p:nvSpPr>
         <p:spPr>
           <a:xfrm rot="16200000">
-            <a:off x="3215048" y="4453249"/>
+            <a:off x="3198572" y="4090783"/>
             <a:ext cx="346364" cy="2995612"/>
           </a:xfrm>
           <a:prstGeom prst="leftBrace">
@@ -16156,13 +16176,13 @@
       </p:sp>
       <p:sp>
         <p:nvSpPr>
-          <p:cNvPr id="35" name="Left Brace 34"/>
+          <p:cNvPr id="83" name="Left Brace 82"/>
           <p:cNvSpPr/>
           <p:nvPr/>
         </p:nvSpPr>
         <p:spPr>
           <a:xfrm rot="16200000">
-            <a:off x="8583544" y="4649381"/>
+            <a:off x="8567068" y="4286915"/>
             <a:ext cx="346364" cy="2603347"/>
           </a:xfrm>
           <a:prstGeom prst="leftBrace">
@@ -16199,13 +16219,13 @@
       </p:sp>
       <p:sp>
         <p:nvSpPr>
-          <p:cNvPr id="37" name="TextBox 36"/>
+          <p:cNvPr id="84" name="TextBox 83"/>
           <p:cNvSpPr txBox="1"/>
           <p:nvPr/>
         </p:nvSpPr>
         <p:spPr>
           <a:xfrm>
-            <a:off x="2953955" y="6129840"/>
+            <a:off x="2937479" y="5767374"/>
             <a:ext cx="796693" cy="369332"/>
           </a:xfrm>
           <a:prstGeom prst="rect">
@@ -16235,13 +16255,13 @@
       </p:sp>
       <p:sp>
         <p:nvSpPr>
-          <p:cNvPr id="38" name="TextBox 37"/>
+          <p:cNvPr id="85" name="TextBox 84"/>
           <p:cNvSpPr txBox="1"/>
           <p:nvPr/>
         </p:nvSpPr>
         <p:spPr>
           <a:xfrm>
-            <a:off x="8404706" y="6129840"/>
+            <a:off x="8388230" y="5767374"/>
             <a:ext cx="704039" cy="369332"/>
           </a:xfrm>
           <a:prstGeom prst="rect">
@@ -20088,10 +20108,12 @@
           <a:p>
             <a:pPr algn="ctr"/>
             <a:r>
-              <a:rPr lang="en-US" dirty="0" smtClean="0">
-                <a:solidFill>
-                  <a:schemeClr val="tx1"/>
-                </a:solidFill>
+              <a:rPr lang="en-US" b="1" dirty="0" smtClean="0">
+                <a:solidFill>
+                  <a:schemeClr val="tx1"/>
+                </a:solidFill>
+                <a:latin typeface="Times New Roman" panose="02020603050405020304" pitchFamily="18" charset="0"/>
+                <a:cs typeface="Times New Roman" panose="02020603050405020304" pitchFamily="18" charset="0"/>
               </a:rPr>
               <a:t>Open category</a:t>
             </a:r>
@@ -20099,25 +20121,21 @@
           <a:p>
             <a:pPr algn="ctr"/>
             <a:r>
-              <a:rPr lang="en-US" dirty="0">
-                <a:solidFill>
-                  <a:schemeClr val="tx1"/>
-                </a:solidFill>
-              </a:rPr>
-              <a:t>(</a:t>
-            </a:r>
-            <a:r>
-              <a:rPr lang="en-US" dirty="0" smtClean="0">
-                <a:solidFill>
-                  <a:schemeClr val="tx1"/>
-                </a:solidFill>
-              </a:rPr>
-              <a:t>Low risk)</a:t>
-            </a:r>
-            <a:endParaRPr lang="en-US" dirty="0">
+              <a:rPr lang="en-US" b="1" dirty="0" smtClean="0">
+                <a:solidFill>
+                  <a:schemeClr val="tx1"/>
+                </a:solidFill>
+                <a:latin typeface="Times New Roman" panose="02020603050405020304" pitchFamily="18" charset="0"/>
+                <a:cs typeface="Times New Roman" panose="02020603050405020304" pitchFamily="18" charset="0"/>
+              </a:rPr>
+              <a:t>(Low risk)</a:t>
+            </a:r>
+            <a:endParaRPr lang="en-US" b="1" dirty="0">
               <a:solidFill>
                 <a:schemeClr val="tx1"/>
               </a:solidFill>
+              <a:latin typeface="Times New Roman" panose="02020603050405020304" pitchFamily="18" charset="0"/>
+              <a:cs typeface="Times New Roman" panose="02020603050405020304" pitchFamily="18" charset="0"/>
             </a:endParaRPr>
           </a:p>
         </p:txBody>
@@ -20167,10 +20185,12 @@
           <a:p>
             <a:pPr algn="ctr"/>
             <a:r>
-              <a:rPr lang="en-US" dirty="0" smtClean="0">
-                <a:solidFill>
-                  <a:schemeClr val="tx1"/>
-                </a:solidFill>
+              <a:rPr lang="en-US" b="1" dirty="0" smtClean="0">
+                <a:solidFill>
+                  <a:schemeClr val="tx1"/>
+                </a:solidFill>
+                <a:latin typeface="Times New Roman" panose="02020603050405020304" pitchFamily="18" charset="0"/>
+                <a:cs typeface="Times New Roman" panose="02020603050405020304" pitchFamily="18" charset="0"/>
               </a:rPr>
               <a:t>Specific category</a:t>
             </a:r>
@@ -20178,17 +20198,21 @@
           <a:p>
             <a:pPr algn="ctr"/>
             <a:r>
-              <a:rPr lang="en-US" dirty="0" smtClean="0">
-                <a:solidFill>
-                  <a:schemeClr val="tx1"/>
-                </a:solidFill>
+              <a:rPr lang="en-US" b="1" dirty="0" smtClean="0">
+                <a:solidFill>
+                  <a:schemeClr val="tx1"/>
+                </a:solidFill>
+                <a:latin typeface="Times New Roman" panose="02020603050405020304" pitchFamily="18" charset="0"/>
+                <a:cs typeface="Times New Roman" panose="02020603050405020304" pitchFamily="18" charset="0"/>
               </a:rPr>
               <a:t>(Medium risk)</a:t>
             </a:r>
-            <a:endParaRPr lang="en-US" dirty="0">
+            <a:endParaRPr lang="en-US" b="1" dirty="0">
               <a:solidFill>
                 <a:schemeClr val="tx1"/>
               </a:solidFill>
+              <a:latin typeface="Times New Roman" panose="02020603050405020304" pitchFamily="18" charset="0"/>
+              <a:cs typeface="Times New Roman" panose="02020603050405020304" pitchFamily="18" charset="0"/>
             </a:endParaRPr>
           </a:p>
         </p:txBody>
@@ -20238,36 +20262,34 @@
           <a:p>
             <a:pPr algn="ctr"/>
             <a:r>
-              <a:rPr lang="en-US" dirty="0" smtClean="0">
-                <a:solidFill>
-                  <a:schemeClr val="tx1"/>
-                </a:solidFill>
-              </a:rPr>
-              <a:t>Certified </a:t>
-            </a:r>
-            <a:r>
-              <a:rPr lang="en-US" dirty="0" smtClean="0">
-                <a:solidFill>
-                  <a:schemeClr val="tx1"/>
-                </a:solidFill>
-              </a:rPr>
-              <a:t>category</a:t>
+              <a:rPr lang="en-US" b="1" dirty="0" smtClean="0">
+                <a:solidFill>
+                  <a:schemeClr val="tx1"/>
+                </a:solidFill>
+                <a:latin typeface="Times New Roman" panose="02020603050405020304" pitchFamily="18" charset="0"/>
+                <a:cs typeface="Times New Roman" panose="02020603050405020304" pitchFamily="18" charset="0"/>
+              </a:rPr>
+              <a:t>Certified category</a:t>
             </a:r>
           </a:p>
           <a:p>
             <a:pPr algn="ctr"/>
             <a:r>
-              <a:rPr lang="en-US" dirty="0" smtClean="0">
-                <a:solidFill>
-                  <a:schemeClr val="tx1"/>
-                </a:solidFill>
+              <a:rPr lang="en-US" b="1" dirty="0" smtClean="0">
+                <a:solidFill>
+                  <a:schemeClr val="tx1"/>
+                </a:solidFill>
+                <a:latin typeface="Times New Roman" panose="02020603050405020304" pitchFamily="18" charset="0"/>
+                <a:cs typeface="Times New Roman" panose="02020603050405020304" pitchFamily="18" charset="0"/>
               </a:rPr>
               <a:t>(High risk)</a:t>
             </a:r>
-            <a:endParaRPr lang="en-US" dirty="0">
+            <a:endParaRPr lang="en-US" b="1" dirty="0">
               <a:solidFill>
                 <a:schemeClr val="tx1"/>
               </a:solidFill>
+              <a:latin typeface="Times New Roman" panose="02020603050405020304" pitchFamily="18" charset="0"/>
+              <a:cs typeface="Times New Roman" panose="02020603050405020304" pitchFamily="18" charset="0"/>
             </a:endParaRPr>
           </a:p>
         </p:txBody>
@@ -23328,47 +23350,7 @@
                 <a:latin typeface="Times New Roman" panose="02020603050405020304" pitchFamily="18" charset="0"/>
                 <a:cs typeface="Times New Roman" panose="02020603050405020304" pitchFamily="18" charset="0"/>
               </a:rPr>
-              <a:t>privacy invasion for </a:t>
-            </a:r>
-            <a:r>
-              <a:rPr lang="fr-FR" dirty="0">
-                <a:solidFill>
-                  <a:schemeClr val="tx1"/>
-                </a:solidFill>
-                <a:latin typeface="Times New Roman" panose="02020603050405020304" pitchFamily="18" charset="0"/>
-                <a:cs typeface="Times New Roman" panose="02020603050405020304" pitchFamily="18" charset="0"/>
-              </a:rPr>
-              <a:t> 3</a:t>
-            </a:r>
-            <a:r>
-              <a:rPr lang="fr-FR" baseline="30000" dirty="0">
-                <a:solidFill>
-                  <a:schemeClr val="tx1"/>
-                </a:solidFill>
-                <a:latin typeface="Times New Roman" panose="02020603050405020304" pitchFamily="18" charset="0"/>
-                <a:cs typeface="Times New Roman" panose="02020603050405020304" pitchFamily="18" charset="0"/>
-              </a:rPr>
-              <a:t>e</a:t>
-            </a:r>
-            <a:r>
-              <a:rPr lang="fr-FR" dirty="0">
-                <a:solidFill>
-                  <a:schemeClr val="tx1"/>
-                </a:solidFill>
-                <a:latin typeface="Times New Roman" panose="02020603050405020304" pitchFamily="18" charset="0"/>
-                <a:cs typeface="Times New Roman" panose="02020603050405020304" pitchFamily="18" charset="0"/>
-              </a:rPr>
-              <a:t> </a:t>
-            </a:r>
-            <a:r>
-              <a:rPr lang="en-US" dirty="0" smtClean="0">
-                <a:solidFill>
-                  <a:schemeClr val="tx1"/>
-                </a:solidFill>
-                <a:latin typeface="Times New Roman" panose="02020603050405020304" pitchFamily="18" charset="0"/>
-                <a:cs typeface="Times New Roman" panose="02020603050405020304" pitchFamily="18" charset="0"/>
-              </a:rPr>
-              <a:t>parties</a:t>
+              <a:t>privacy violation</a:t>
             </a:r>
           </a:p>
         </p:txBody>

</xml_diff>